<commit_message>
updated poster, TESTING AND LEARNED section
</commit_message>
<xml_diff>
--- a/docs/other/poster.pptx
+++ b/docs/other/poster.pptx
@@ -165,7 +165,10 @@
 <file path=ppt/revisionInfo.xml><?xml version="1.0" encoding="utf-8"?>
 <p1510:revInfo xmlns:a="http://schemas.openxmlformats.org/drawingml/2006/main" xmlns:r="http://schemas.openxmlformats.org/officeDocument/2006/relationships" xmlns:p1510="http://schemas.microsoft.com/office/powerpoint/2015/10/main">
   <p1510:revLst>
+    <p1510:client id="{2D948757-4433-F95A-DB73-47E54D824748}" v="850" dt="2025-12-12T01:45:36.980"/>
     <p1510:client id="{7F7B17F7-A383-9CE5-366E-D51BE649C0DE}" v="6" dt="2025-12-12T00:30:34.751"/>
+    <p1510:client id="{D75F5725-CC26-F482-C346-F075C098FEF7}" v="1213" dt="2025-12-12T16:08:27.766"/>
+    <p1510:client id="{F81DF582-C668-E107-8D96-F233A124E7B9}" v="549" dt="2025-12-12T15:29:52.934"/>
   </p1510:revLst>
 </p1510:revInfo>
 </file>
@@ -253,7 +256,7 @@
             <a:fld id="{5A0289FA-5C8D-47D8-9AF4-5913895D4286}" type="datetimeFigureOut">
               <a:rPr lang="en-US" smtClean="0"/>
               <a:pPr/>
-              <a:t>12/11/2025</a:t>
+              <a:t>12/12/2025</a:t>
             </a:fld>
             <a:endParaRPr lang="en-US"/>
           </a:p>
@@ -884,7 +887,7 @@
               <a:pPr>
                 <a:defRPr/>
               </a:pPr>
-              <a:t>12/11/2025</a:t>
+              <a:t>12/12/2025</a:t>
             </a:fld>
             <a:endParaRPr lang="en-US"/>
           </a:p>
@@ -1074,7 +1077,7 @@
               <a:pPr>
                 <a:defRPr/>
               </a:pPr>
-              <a:t>12/11/2025</a:t>
+              <a:t>12/12/2025</a:t>
             </a:fld>
             <a:endParaRPr lang="en-US"/>
           </a:p>
@@ -1274,7 +1277,7 @@
               <a:pPr>
                 <a:defRPr/>
               </a:pPr>
-              <a:t>12/11/2025</a:t>
+              <a:t>12/12/2025</a:t>
             </a:fld>
             <a:endParaRPr lang="en-US"/>
           </a:p>
@@ -1464,7 +1467,7 @@
               <a:pPr>
                 <a:defRPr/>
               </a:pPr>
-              <a:t>12/11/2025</a:t>
+              <a:t>12/12/2025</a:t>
             </a:fld>
             <a:endParaRPr lang="en-US"/>
           </a:p>
@@ -1731,7 +1734,7 @@
               <a:pPr>
                 <a:defRPr/>
               </a:pPr>
-              <a:t>12/11/2025</a:t>
+              <a:t>12/12/2025</a:t>
             </a:fld>
             <a:endParaRPr lang="en-US"/>
           </a:p>
@@ -2038,7 +2041,7 @@
               <a:pPr>
                 <a:defRPr/>
               </a:pPr>
-              <a:t>12/11/2025</a:t>
+              <a:t>12/12/2025</a:t>
             </a:fld>
             <a:endParaRPr lang="en-US"/>
           </a:p>
@@ -2484,7 +2487,7 @@
               <a:pPr>
                 <a:defRPr/>
               </a:pPr>
-              <a:t>12/11/2025</a:t>
+              <a:t>12/12/2025</a:t>
             </a:fld>
             <a:endParaRPr lang="en-US"/>
           </a:p>
@@ -2623,7 +2626,7 @@
               <a:pPr>
                 <a:defRPr/>
               </a:pPr>
-              <a:t>12/11/2025</a:t>
+              <a:t>12/12/2025</a:t>
             </a:fld>
             <a:endParaRPr lang="en-US"/>
           </a:p>
@@ -2740,7 +2743,7 @@
               <a:pPr>
                 <a:defRPr/>
               </a:pPr>
-              <a:t>12/11/2025</a:t>
+              <a:t>12/12/2025</a:t>
             </a:fld>
             <a:endParaRPr lang="en-US"/>
           </a:p>
@@ -3037,7 +3040,7 @@
               <a:pPr>
                 <a:defRPr/>
               </a:pPr>
-              <a:t>12/11/2025</a:t>
+              <a:t>12/12/2025</a:t>
             </a:fld>
             <a:endParaRPr lang="en-US"/>
           </a:p>
@@ -3314,7 +3317,7 @@
               <a:pPr>
                 <a:defRPr/>
               </a:pPr>
-              <a:t>12/11/2025</a:t>
+              <a:t>12/12/2025</a:t>
             </a:fld>
             <a:endParaRPr lang="en-US"/>
           </a:p>
@@ -3569,7 +3572,7 @@
               <a:pPr>
                 <a:defRPr/>
               </a:pPr>
-              <a:t>12/11/2025</a:t>
+              <a:t>12/12/2025</a:t>
             </a:fld>
             <a:endParaRPr lang="en-US"/>
           </a:p>
@@ -4468,7 +4471,7 @@
               </a:lnSpc>
             </a:pPr>
             <a:r>
-              <a:rPr lang="en-US" sz="6000" b="1" dirty="0">
+              <a:rPr lang="en-US" sz="6000" b="1">
                 <a:latin typeface="Verdana"/>
                 <a:ea typeface="Verdana"/>
                 <a:cs typeface="Verdana" panose="020B0604030504040204" pitchFamily="34" charset="0"/>
@@ -4482,7 +4485,7 @@
               <a:buChar char="•"/>
             </a:pPr>
             <a:r>
-              <a:rPr lang="en-US" sz="2800" dirty="0">
+              <a:rPr lang="en-US" sz="2800">
                 <a:latin typeface="Verdana"/>
                 <a:ea typeface="Verdana"/>
                 <a:cs typeface="Verdana" panose="020B0604030504040204" pitchFamily="34" charset="0"/>
@@ -4490,7 +4493,7 @@
               <a:t>Rein Alderfer, Alexander Pellet, Drew </a:t>
             </a:r>
             <a:r>
-              <a:rPr lang="en-US" sz="2800" dirty="0" err="1">
+              <a:rPr lang="en-US" sz="2800" err="1">
                 <a:latin typeface="Verdana"/>
                 <a:ea typeface="Verdana"/>
                 <a:cs typeface="Verdana" panose="020B0604030504040204" pitchFamily="34" charset="0"/>
@@ -4498,7 +4501,7 @@
               <a:t>Urenko</a:t>
             </a:r>
             <a:r>
-              <a:rPr lang="en-US" sz="2800" dirty="0">
+              <a:rPr lang="en-US" sz="2800">
                 <a:latin typeface="Verdana"/>
                 <a:ea typeface="Verdana"/>
                 <a:cs typeface="Verdana" panose="020B0604030504040204" pitchFamily="34" charset="0"/>
@@ -4512,14 +4515,14 @@
               <a:buChar char="•"/>
             </a:pPr>
             <a:r>
-              <a:rPr lang="en-US" sz="2800" dirty="0">
+              <a:rPr lang="en-US" sz="2800">
                 <a:latin typeface="Verdana"/>
                 <a:ea typeface="Verdana"/>
                 <a:cs typeface="Verdana" panose="020B0604030504040204" pitchFamily="34" charset="0"/>
               </a:rPr>
               <a:t>Professor Nancy Reddig</a:t>
             </a:r>
-            <a:endParaRPr lang="en-US" sz="6000" b="1" dirty="0">
+            <a:endParaRPr lang="en-US" sz="6000" b="1">
               <a:latin typeface="Verdana"/>
               <a:ea typeface="Verdana"/>
               <a:cs typeface="Verdana" panose="020B0604030504040204" pitchFamily="34" charset="0"/>
@@ -4532,7 +4535,7 @@
               </a:lnSpc>
             </a:pPr>
             <a:r>
-              <a:rPr lang="en-US" sz="6000" b="1" dirty="0">
+              <a:rPr lang="en-US" sz="6000" b="1">
                 <a:latin typeface="Verdana"/>
                 <a:ea typeface="Verdana"/>
                 <a:cs typeface="Verdana" panose="020B0604030504040204" pitchFamily="34" charset="0"/>
@@ -5054,8 +5057,8 @@
         </p:nvSpPr>
         <p:spPr bwMode="auto">
           <a:xfrm>
-            <a:off x="616405" y="22449466"/>
-            <a:ext cx="9714626" cy="3693319"/>
+            <a:off x="361963" y="22290439"/>
+            <a:ext cx="10477950" cy="3954929"/>
           </a:xfrm>
           <a:prstGeom prst="rect">
             <a:avLst/>
@@ -5069,7 +5072,7 @@
           </a:ln>
         </p:spPr>
         <p:txBody>
-          <a:bodyPr wrap="square">
+          <a:bodyPr wrap="square" lIns="91440" tIns="45720" rIns="91440" bIns="45720" anchor="t">
             <a:spAutoFit/>
           </a:bodyPr>
           <a:lstStyle/>
@@ -5080,45 +5083,65 @@
               </a:lnSpc>
             </a:pPr>
             <a:r>
-              <a:rPr lang="en-US" sz="4400" b="1">
+              <a:rPr lang="en-US" sz="4300" b="1" dirty="0">
                 <a:solidFill>
                   <a:srgbClr val="004B98"/>
                 </a:solidFill>
-                <a:latin typeface="Verdana" panose="020B0604030504040204" pitchFamily="34" charset="0"/>
-                <a:ea typeface="Verdana" panose="020B0604030504040204" pitchFamily="34" charset="0"/>
+                <a:latin typeface="Verdana"/>
+                <a:ea typeface="Verdana"/>
                 <a:cs typeface="Verdana" panose="020B0604030504040204" pitchFamily="34" charset="0"/>
               </a:rPr>
-              <a:t>TESTING PROCESS OR LESSONS LEARNED</a:t>
-            </a:r>
-          </a:p>
-          <a:p>
-            <a:r>
-              <a:rPr lang="en-US" sz="2400">
+              <a:t>TESTING &amp; LESSONS LEARNED</a:t>
+            </a:r>
+          </a:p>
+          <a:p>
+            <a:r>
+              <a:rPr lang="en-US" sz="2200" dirty="0">
                 <a:solidFill>
                   <a:schemeClr val="bg1"/>
                 </a:solidFill>
-                <a:latin typeface="Verdana" panose="020B0604030504040204" pitchFamily="34" charset="0"/>
-                <a:ea typeface="Verdana" panose="020B0604030504040204" pitchFamily="34" charset="0"/>
+                <a:latin typeface="Verdana"/>
+                <a:ea typeface="Verdana"/>
                 <a:cs typeface="Verdana" panose="020B0604030504040204" pitchFamily="34" charset="0"/>
               </a:rPr>
-              <a:t>Explain what you learned about the software engineering life cycle through this hands-on project developed in Git using Agile practices including a project board with weekly stand-up meetings.</a:t>
-            </a:r>
-          </a:p>
-          <a:p>
-            <a:r>
-              <a:rPr lang="en-US" sz="2400">
+              <a:t>Our team used Git version control and weekly </a:t>
+            </a:r>
+            <a:r>
+              <a:rPr lang="en-US" sz="2200">
                 <a:solidFill>
                   <a:schemeClr val="bg1"/>
                 </a:solidFill>
-                <a:latin typeface="Verdana" panose="020B0604030504040204" pitchFamily="34" charset="0"/>
-                <a:ea typeface="Verdana" panose="020B0604030504040204" pitchFamily="34" charset="0"/>
+                <a:latin typeface="Verdana"/>
+                <a:ea typeface="Verdana"/>
                 <a:cs typeface="Verdana" panose="020B0604030504040204" pitchFamily="34" charset="0"/>
               </a:rPr>
-              <a:t>Or use your traceability matrix and discuss your use cases and test coverage.</a:t>
-            </a:r>
-            <a:endParaRPr lang="en-US" sz="2400">
+              <a:t>stand-up</a:t>
+            </a:r>
+            <a:r>
+              <a:rPr lang="en-US" sz="2200" dirty="0">
+                <a:solidFill>
+                  <a:schemeClr val="bg1"/>
+                </a:solidFill>
+                <a:latin typeface="Verdana"/>
+                <a:ea typeface="Verdana"/>
+                <a:cs typeface="Verdana" panose="020B0604030504040204" pitchFamily="34" charset="0"/>
+              </a:rPr>
+              <a:t> meetings to manage work across all project requirements using a project board in GitHub to track tasks and coordinate how the front and backend code fit together. Through testing our management system, we learned that the Singleton database connection kept things running smoothly and our reusable page template majorly reduced code.</a:t>
+            </a:r>
+            <a:r>
+              <a:rPr lang="en-US" sz="2400" dirty="0">
+                <a:solidFill>
+                  <a:schemeClr val="bg1"/>
+                </a:solidFill>
+                <a:latin typeface="Verdana"/>
+                <a:ea typeface="Verdana"/>
+                <a:cs typeface="Verdana" panose="020B0604030504040204" pitchFamily="34" charset="0"/>
+              </a:rPr>
+              <a:t> This process taught us that building one feature at a time and testing it individually before combining made debugging easier, along with team check-ins to improve features based on what worked best. </a:t>
+            </a:r>
+            <a:endParaRPr lang="en-US" sz="2400" dirty="0">
               <a:solidFill>
-                <a:srgbClr val="0A2240"/>
+                <a:schemeClr val="bg1"/>
               </a:solidFill>
               <a:latin typeface="Verdana" panose="020B0604030504040204" pitchFamily="34" charset="0"/>
               <a:ea typeface="Verdana" panose="020B0604030504040204" pitchFamily="34" charset="0"/>
@@ -5469,10 +5492,10 @@
       </p:pic>
       <p:pic>
         <p:nvPicPr>
-          <p:cNvPr id="9" name="Picture 8">
+          <p:cNvPr id="9" name="Picture 8" descr="A computer screen shot of a code&#10;&#10;AI-generated content may be incorrect.">
             <a:extLst>
               <a:ext uri="{FF2B5EF4-FFF2-40B4-BE49-F238E27FC236}">
-                <a16:creationId xmlns:a16="http://schemas.microsoft.com/office/drawing/2014/main" id="{08C464A6-60C9-9D80-D3D1-AAFA156BD5B0}"/>
+                <a16:creationId xmlns:a16="http://schemas.microsoft.com/office/drawing/2014/main" id="{55DCD7E9-3F8C-9D2C-CA22-160B81E380B5}"/>
               </a:ext>
             </a:extLst>
           </p:cNvPr>
@@ -5483,15 +5506,14 @@
         </p:nvPicPr>
         <p:blipFill>
           <a:blip r:embed="rId6"/>
-          <a:srcRect l="19528" r="1803"/>
           <a:stretch>
             <a:fillRect/>
           </a:stretch>
         </p:blipFill>
         <p:spPr>
           <a:xfrm>
-            <a:off x="9165043" y="17916926"/>
-            <a:ext cx="9812626" cy="3377117"/>
+            <a:off x="9125157" y="18517428"/>
+            <a:ext cx="6844003" cy="2960205"/>
           </a:xfrm>
           <a:prstGeom prst="rect">
             <a:avLst/>
@@ -5512,9 +5534,9 @@
         </p:nvGrpSpPr>
         <p:grpSpPr>
           <a:xfrm>
-            <a:off x="14222588" y="19092754"/>
-            <a:ext cx="7375827" cy="2815150"/>
-            <a:chOff x="2310689" y="4870965"/>
+            <a:off x="14348680" y="19007975"/>
+            <a:ext cx="7072432" cy="2549321"/>
+            <a:chOff x="2087371" y="5007162"/>
             <a:chExt cx="9290050" cy="4374987"/>
           </a:xfrm>
         </p:grpSpPr>
@@ -5532,7 +5554,7 @@
           </p:nvSpPr>
           <p:spPr>
             <a:xfrm>
-              <a:off x="2310689" y="4870965"/>
+              <a:off x="2087371" y="5007162"/>
               <a:ext cx="9290050" cy="4374987"/>
             </a:xfrm>
             <a:prstGeom prst="rect">
@@ -5584,8 +5606,8 @@
           </p:nvSpPr>
           <p:spPr>
             <a:xfrm>
-              <a:off x="2508651" y="5361379"/>
-              <a:ext cx="8624769" cy="2603616"/>
+              <a:off x="2191400" y="5497576"/>
+              <a:ext cx="8671737" cy="3670900"/>
             </a:xfrm>
             <a:prstGeom prst="rect">
               <a:avLst/>
@@ -5603,13 +5625,16 @@
                 </a:spcAft>
               </a:pPr>
               <a:r>
-                <a:rPr lang="en-US" sz="4400" b="1" dirty="0">
-                  <a:latin typeface="Verdana" panose="020B0604030504040204" pitchFamily="34" charset="0"/>
-                  <a:ea typeface="Verdana" panose="020B0604030504040204" pitchFamily="34" charset="0"/>
+                <a:rPr lang="en-US" sz="4400" b="1">
+                  <a:latin typeface="Verdana"/>
+                  <a:ea typeface="Verdana"/>
                   <a:cs typeface="Verdana" panose="020B0604030504040204" pitchFamily="34" charset="0"/>
                 </a:rPr>
                 <a:t>IMPACT</a:t>
               </a:r>
+              <a:endParaRPr lang="en-US" sz="3800">
+                <a:cs typeface="Arial"/>
+              </a:endParaRPr>
             </a:p>
             <a:p>
               <a:pPr>
@@ -5618,11 +5643,11 @@
                 </a:spcAft>
               </a:pPr>
               <a:r>
-                <a:rPr lang="en-US" sz="2800" dirty="0">
+                <a:rPr lang="en-US" sz="2800">
                   <a:latin typeface="Verdana"/>
                   <a:ea typeface="Verdana"/>
                 </a:rPr>
-                <a:t>We have developed an easy to use inventory management system that businesses can use.</a:t>
+                <a:t>We have developed an easy-to-use inventory management system that businesses can use.</a:t>
               </a:r>
             </a:p>
           </p:txBody>
@@ -5651,7 +5676,7 @@
           <a:noFill/>
         </p:spPr>
         <p:txBody>
-          <a:bodyPr wrap="square">
+          <a:bodyPr wrap="square" lIns="91440" tIns="45720" rIns="91440" bIns="45720" anchor="t">
             <a:spAutoFit/>
           </a:bodyPr>
           <a:lstStyle/>
@@ -5665,92 +5690,71 @@
               </a:spcAft>
             </a:pPr>
             <a:r>
-              <a:rPr lang="en-US" sz="4400" b="1" dirty="0">
+              <a:rPr lang="en-US" sz="4400" b="1">
                 <a:solidFill>
                   <a:srgbClr val="004B98"/>
                 </a:solidFill>
-                <a:latin typeface="Verdana" panose="020B0604030504040204" pitchFamily="34" charset="0"/>
-                <a:ea typeface="Verdana" panose="020B0604030504040204" pitchFamily="34" charset="0"/>
+                <a:latin typeface="Verdana"/>
+                <a:ea typeface="Verdana"/>
                 <a:cs typeface="Verdana" panose="020B0604030504040204" pitchFamily="34" charset="0"/>
               </a:rPr>
               <a:t>PROTOTYPE/PROCESS</a:t>
             </a:r>
-            <a:endParaRPr lang="en-US" sz="4400" b="1" dirty="0">
+            <a:endParaRPr lang="en-US" sz="4400" b="1">
               <a:solidFill>
                 <a:schemeClr val="tx1"/>
               </a:solidFill>
-              <a:latin typeface="Verdana" panose="020B0604030504040204" pitchFamily="34" charset="0"/>
-              <a:ea typeface="Verdana" panose="020B0604030504040204" pitchFamily="34" charset="0"/>
+              <a:latin typeface="Verdana"/>
+              <a:ea typeface="Verdana"/>
               <a:cs typeface="Verdana" panose="020B0604030504040204" pitchFamily="34" charset="0"/>
             </a:endParaRPr>
           </a:p>
           <a:p>
             <a:r>
-              <a:rPr lang="en-US" sz="4000" dirty="0">
+              <a:rPr lang="en-US" sz="4000">
                 <a:solidFill>
                   <a:schemeClr val="bg1"/>
                 </a:solidFill>
-                <a:latin typeface="Verdana" panose="020B0604030504040204" pitchFamily="34" charset="0"/>
-                <a:ea typeface="Verdana" panose="020B0604030504040204" pitchFamily="34" charset="0"/>
+                <a:latin typeface="Verdana"/>
+                <a:ea typeface="Verdana"/>
                 <a:cs typeface="Verdana" panose="020B0604030504040204" pitchFamily="34" charset="0"/>
               </a:rPr>
-              <a:t>The key features of our project are inventory management, user</a:t>
-            </a:r>
-          </a:p>
-          <a:p>
-            <a:r>
-              <a:rPr lang="en-US" sz="4000" dirty="0">
+              <a:t>The key features of our project are inventory management, user management, order management, and the UI of the site. </a:t>
+            </a:r>
+          </a:p>
+          <a:p>
+            <a:pPr marL="342900" indent="-342900">
+              <a:buFont typeface="Arial"/>
+              <a:buChar char="•"/>
+            </a:pPr>
+            <a:r>
+              <a:rPr lang="en-US" sz="2400">
                 <a:solidFill>
                   <a:schemeClr val="bg1"/>
                 </a:solidFill>
-                <a:latin typeface="Verdana" panose="020B0604030504040204" pitchFamily="34" charset="0"/>
-                <a:ea typeface="Verdana" panose="020B0604030504040204" pitchFamily="34" charset="0"/>
+                <a:latin typeface="Verdana"/>
+                <a:ea typeface="Verdana"/>
                 <a:cs typeface="Verdana" panose="020B0604030504040204" pitchFamily="34" charset="0"/>
               </a:rPr>
-              <a:t>management, order management, and the UI of the site. ​</a:t>
-            </a:r>
-          </a:p>
-          <a:p>
-            <a:pPr marL="571500" indent="-571500">
-              <a:buFont typeface="Arial" panose="020B0604020202020204" pitchFamily="34" charset="0"/>
+              <a:t>From the beginning we wanted to have a nice UI for the site, that could transition from light to dark mode.</a:t>
+            </a:r>
+          </a:p>
+          <a:p>
+            <a:pPr marL="342900" indent="-342900">
+              <a:buFont typeface="Arial"/>
               <a:buChar char="•"/>
             </a:pPr>
             <a:r>
-              <a:rPr lang="en-US" sz="2400" dirty="0">
+              <a:rPr lang="en-US" sz="2400">
                 <a:solidFill>
                   <a:schemeClr val="bg1"/>
                 </a:solidFill>
-                <a:latin typeface="Verdana" panose="020B0604030504040204" pitchFamily="34" charset="0"/>
-                <a:ea typeface="Verdana" panose="020B0604030504040204" pitchFamily="34" charset="0"/>
+                <a:latin typeface="Verdana"/>
+                <a:ea typeface="Verdana"/>
                 <a:cs typeface="Verdana" panose="020B0604030504040204" pitchFamily="34" charset="0"/>
               </a:rPr>
-              <a:t>From the beginning we wanted to have a nice UI for the site, that could transition from light to dark mode.​</a:t>
-            </a:r>
-          </a:p>
-          <a:p>
-            <a:pPr marL="571500" indent="-571500">
-              <a:buFont typeface="Arial" panose="020B0604020202020204" pitchFamily="34" charset="0"/>
-              <a:buChar char="•"/>
-            </a:pPr>
-            <a:r>
-              <a:rPr lang="en-US" sz="2400" dirty="0">
-                <a:solidFill>
-                  <a:schemeClr val="bg1"/>
-                </a:solidFill>
-                <a:latin typeface="Verdana" panose="020B0604030504040204" pitchFamily="34" charset="0"/>
-                <a:ea typeface="Verdana" panose="020B0604030504040204" pitchFamily="34" charset="0"/>
-                <a:cs typeface="Verdana" panose="020B0604030504040204" pitchFamily="34" charset="0"/>
-              </a:rPr>
-              <a:t>We used a unifying page class to remove the concerns for standardization of the pages.</a:t>
-            </a:r>
-            <a:endParaRPr lang="en-US" sz="2400" b="1" dirty="0">
-              <a:solidFill>
-                <a:schemeClr val="bg1"/>
-              </a:solidFill>
-              <a:latin typeface="Verdana" panose="020B0604030504040204" pitchFamily="34" charset="0"/>
-              <a:ea typeface="Verdana" panose="020B0604030504040204" pitchFamily="34" charset="0"/>
-              <a:cs typeface="Verdana" panose="020B0604030504040204" pitchFamily="34" charset="0"/>
-            </a:endParaRPr>
+              <a:t>We used a unifying page class to remove the concerns for standardization of the pages.</a:t>
+            </a:r>
           </a:p>
         </p:txBody>
       </p:sp>
@@ -5828,8 +5832,8 @@
         </p:blipFill>
         <p:spPr>
           <a:xfrm>
-            <a:off x="12904117" y="6659662"/>
-            <a:ext cx="7375828" cy="7026633"/>
+            <a:off x="16602813" y="7645980"/>
+            <a:ext cx="4457968" cy="4190966"/>
           </a:xfrm>
           <a:prstGeom prst="rect">
             <a:avLst/>
@@ -5850,7 +5854,7 @@
         </p:nvSpPr>
         <p:spPr>
           <a:xfrm>
-            <a:off x="16128760" y="13924352"/>
+            <a:off x="16704113" y="11828424"/>
             <a:ext cx="4533900" cy="461665"/>
           </a:xfrm>
           <a:prstGeom prst="rect">
@@ -5886,7 +5890,7 @@
           <p:cNvPr id="3" name="TextBox 2">
             <a:extLst>
               <a:ext uri="{FF2B5EF4-FFF2-40B4-BE49-F238E27FC236}">
-                <a16:creationId xmlns:a16="http://schemas.microsoft.com/office/drawing/2014/main" id="{D7D572B4-21D9-D6B3-EB6D-5BDD7A9E5D7E}"/>
+                <a16:creationId xmlns:a16="http://schemas.microsoft.com/office/drawing/2014/main" id="{7E6DE4EE-B33B-0050-6CA4-FD833B667E32}"/>
               </a:ext>
             </a:extLst>
           </p:cNvPr>
@@ -5895,18 +5899,16 @@
         </p:nvSpPr>
         <p:spPr>
           <a:xfrm>
-            <a:off x="23952701" y="15580477"/>
+            <a:off x="22697522" y="15318403"/>
             <a:ext cx="18606108" cy="2785378"/>
           </a:xfrm>
           <a:prstGeom prst="rect">
             <a:avLst/>
           </a:prstGeom>
-          <a:solidFill>
-            <a:schemeClr val="tx1"/>
-          </a:solidFill>
+          <a:noFill/>
         </p:spPr>
         <p:txBody>
-          <a:bodyPr wrap="square">
+          <a:bodyPr wrap="square" lIns="91440" tIns="45720" rIns="91440" bIns="45720" anchor="t">
             <a:spAutoFit/>
           </a:bodyPr>
           <a:lstStyle/>
@@ -5920,43 +5922,43 @@
               </a:spcAft>
             </a:pPr>
             <a:r>
-              <a:rPr lang="en-US" sz="4400" b="1" dirty="0">
+              <a:rPr lang="en-US" sz="4400" b="1">
                 <a:solidFill>
                   <a:srgbClr val="004B98"/>
                 </a:solidFill>
-                <a:latin typeface="Verdana" panose="020B0604030504040204" pitchFamily="34" charset="0"/>
-                <a:ea typeface="Verdana" panose="020B0604030504040204" pitchFamily="34" charset="0"/>
+                <a:latin typeface="Verdana"/>
+                <a:ea typeface="Verdana"/>
                 <a:cs typeface="Verdana" panose="020B0604030504040204" pitchFamily="34" charset="0"/>
               </a:rPr>
               <a:t>PROTOTYPE/PROCESS</a:t>
             </a:r>
-            <a:endParaRPr lang="en-US" sz="4400" b="1" dirty="0">
+            <a:endParaRPr lang="en-US" sz="4400" b="1">
               <a:solidFill>
                 <a:schemeClr val="tx1"/>
               </a:solidFill>
-              <a:latin typeface="Verdana" panose="020B0604030504040204" pitchFamily="34" charset="0"/>
-              <a:ea typeface="Verdana" panose="020B0604030504040204" pitchFamily="34" charset="0"/>
+              <a:latin typeface="Verdana"/>
+              <a:ea typeface="Verdana"/>
               <a:cs typeface="Verdana" panose="020B0604030504040204" pitchFamily="34" charset="0"/>
             </a:endParaRPr>
           </a:p>
           <a:p>
             <a:r>
-              <a:rPr lang="en-US" sz="4000" dirty="0">
+              <a:rPr lang="en-US" sz="4000">
                 <a:solidFill>
                   <a:schemeClr val="bg1"/>
                 </a:solidFill>
-                <a:latin typeface="Verdana" panose="020B0604030504040204" pitchFamily="34" charset="0"/>
-                <a:ea typeface="Verdana" panose="020B0604030504040204" pitchFamily="34" charset="0"/>
+                <a:latin typeface="Verdana"/>
+                <a:ea typeface="Verdana"/>
                 <a:cs typeface="Verdana" panose="020B0604030504040204" pitchFamily="34" charset="0"/>
               </a:rPr>
               <a:t>Consider screenshots of your project. Pointing out the key features, design aspects, improvements, and performance. These should conceptually map to your design specifications. </a:t>
             </a:r>
-            <a:endParaRPr lang="en-US" sz="5400" b="1" dirty="0">
+            <a:endParaRPr lang="en-US" sz="5400" b="1">
               <a:solidFill>
                 <a:schemeClr val="bg1"/>
               </a:solidFill>
-              <a:latin typeface="Verdana" panose="020B0604030504040204" pitchFamily="34" charset="0"/>
-              <a:ea typeface="Verdana" panose="020B0604030504040204" pitchFamily="34" charset="0"/>
+              <a:latin typeface="Verdana"/>
+              <a:ea typeface="Verdana"/>
               <a:cs typeface="Verdana" panose="020B0604030504040204" pitchFamily="34" charset="0"/>
             </a:endParaRPr>
           </a:p>
@@ -5964,98 +5966,186 @@
       </p:sp>
       <p:pic>
         <p:nvPicPr>
-          <p:cNvPr id="1026" name="Picture 2" descr="A screenshot of a website&#10;&#10;AI-generated content may be incorrect.">
+          <p:cNvPr id="5" name="Picture 4" descr="A screenshot of a website&#10;&#10;AI-generated content may be incorrect.">
             <a:extLst>
               <a:ext uri="{FF2B5EF4-FFF2-40B4-BE49-F238E27FC236}">
-                <a16:creationId xmlns:a16="http://schemas.microsoft.com/office/drawing/2014/main" id="{37BC980C-2BED-EC79-5CBA-12827844A1FD}"/>
+                <a16:creationId xmlns:a16="http://schemas.microsoft.com/office/drawing/2014/main" id="{3C85A9CE-E1A5-C207-14C2-B90A2746E792}"/>
               </a:ext>
             </a:extLst>
           </p:cNvPr>
           <p:cNvPicPr>
-            <a:picLocks noChangeAspect="1" noChangeArrowheads="1"/>
+            <a:picLocks noChangeAspect="1"/>
           </p:cNvPicPr>
           <p:nvPr/>
         </p:nvPicPr>
         <p:blipFill>
-          <a:blip r:embed="rId8">
-            <a:extLst>
-              <a:ext uri="{28A0092B-C50C-407E-A947-70E740481C1C}">
-                <a14:useLocalDpi xmlns:a14="http://schemas.microsoft.com/office/drawing/2010/main" val="0"/>
-              </a:ext>
-            </a:extLst>
-          </a:blip>
-          <a:srcRect/>
+          <a:blip r:embed="rId8"/>
+          <a:srcRect l="1205" r="-3341" b="36806"/>
           <a:stretch>
             <a:fillRect/>
           </a:stretch>
         </p:blipFill>
-        <p:spPr bwMode="auto">
+        <p:spPr>
           <a:xfrm>
-            <a:off x="694175" y="17968206"/>
-            <a:ext cx="8057670" cy="2744598"/>
+            <a:off x="613126" y="18520396"/>
+            <a:ext cx="8735821" cy="2986967"/>
+          </a:xfrm>
+          <a:prstGeom prst="rect">
+            <a:avLst/>
+          </a:prstGeom>
+        </p:spPr>
+      </p:pic>
+      <p:sp>
+        <p:nvSpPr>
+          <p:cNvPr id="21" name="TextBox 20">
+            <a:extLst>
+              <a:ext uri="{FF2B5EF4-FFF2-40B4-BE49-F238E27FC236}">
+                <a16:creationId xmlns:a16="http://schemas.microsoft.com/office/drawing/2014/main" id="{2E8F5811-4571-45B3-863D-9B64CE703423}"/>
+              </a:ext>
+            </a:extLst>
+          </p:cNvPr>
+          <p:cNvSpPr txBox="1"/>
+          <p:nvPr/>
+        </p:nvSpPr>
+        <p:spPr>
+          <a:xfrm>
+            <a:off x="11281024" y="6904233"/>
+            <a:ext cx="4685015" cy="677108"/>
           </a:xfrm>
           <a:prstGeom prst="rect">
             <a:avLst/>
           </a:prstGeom>
           <a:noFill/>
-          <a:extLst>
-            <a:ext uri="{909E8E84-426E-40DD-AFC4-6F175D3DCCD1}">
-              <a14:hiddenFill xmlns:a14="http://schemas.microsoft.com/office/drawing/2010/main">
-                <a:solidFill>
-                  <a:srgbClr val="FFFFFF"/>
-                </a:solidFill>
-              </a14:hiddenFill>
-            </a:ext>
-          </a:extLst>
         </p:spPr>
-      </p:pic>
-      <p:pic>
-        <p:nvPicPr>
-          <p:cNvPr id="1028" name="Picture 4" descr="A computer screen shot of a code&#10;&#10;AI-generated content may be incorrect.">
+        <p:txBody>
+          <a:bodyPr rot="0" spcFirstLastPara="0" vertOverflow="overflow" horzOverflow="overflow" vert="horz" wrap="square" lIns="91440" tIns="45720" rIns="91440" bIns="45720" numCol="1" spcCol="0" rtlCol="0" fromWordArt="0" anchor="t" anchorCtr="0" forceAA="0" compatLnSpc="1">
+            <a:prstTxWarp prst="textNoShape">
+              <a:avLst/>
+            </a:prstTxWarp>
+            <a:spAutoFit/>
+          </a:bodyPr>
+          <a:lstStyle/>
+          <a:p>
+            <a:r>
+              <a:rPr lang="en-US" sz="3800" dirty="0">
+                <a:latin typeface="Arial"/>
+                <a:cs typeface="Arial"/>
+              </a:rPr>
+              <a:t>We have</a:t>
+            </a:r>
+            <a:endParaRPr lang="en-US" dirty="0"/>
+          </a:p>
+        </p:txBody>
+      </p:sp>
+      <p:sp>
+        <p:nvSpPr>
+          <p:cNvPr id="22" name="TextBox 21">
             <a:extLst>
               <a:ext uri="{FF2B5EF4-FFF2-40B4-BE49-F238E27FC236}">
-                <a16:creationId xmlns:a16="http://schemas.microsoft.com/office/drawing/2014/main" id="{55E1C58E-AF0E-81C2-85E9-20353E0859C8}"/>
+                <a16:creationId xmlns:a16="http://schemas.microsoft.com/office/drawing/2014/main" id="{2330CC6A-5A0A-8D58-0383-E5F699D17347}"/>
               </a:ext>
             </a:extLst>
           </p:cNvPr>
-          <p:cNvPicPr>
-            <a:picLocks noChangeAspect="1" noChangeArrowheads="1"/>
-          </p:cNvPicPr>
+          <p:cNvSpPr txBox="1"/>
           <p:nvPr/>
-        </p:nvPicPr>
-        <p:blipFill>
-          <a:blip r:embed="rId9">
-            <a:extLst>
-              <a:ext uri="{28A0092B-C50C-407E-A947-70E740481C1C}">
-                <a14:useLocalDpi xmlns:a14="http://schemas.microsoft.com/office/drawing/2010/main" val="0"/>
-              </a:ext>
-            </a:extLst>
-          </a:blip>
-          <a:srcRect/>
-          <a:stretch>
-            <a:fillRect/>
-          </a:stretch>
-        </p:blipFill>
-        <p:spPr bwMode="auto">
+        </p:nvSpPr>
+        <p:spPr>
           <a:xfrm>
-            <a:off x="3552206" y="19340505"/>
-            <a:ext cx="5927074" cy="2612946"/>
+            <a:off x="11260476" y="7335749"/>
+            <a:ext cx="5137078" cy="6217087"/>
           </a:xfrm>
           <a:prstGeom prst="rect">
             <a:avLst/>
           </a:prstGeom>
           <a:noFill/>
-          <a:extLst>
-            <a:ext uri="{909E8E84-426E-40DD-AFC4-6F175D3DCCD1}">
-              <a14:hiddenFill xmlns:a14="http://schemas.microsoft.com/office/drawing/2010/main">
-                <a:solidFill>
-                  <a:srgbClr val="FFFFFF"/>
-                </a:solidFill>
-              </a14:hiddenFill>
-            </a:ext>
-          </a:extLst>
         </p:spPr>
-      </p:pic>
+        <p:txBody>
+          <a:bodyPr rot="0" spcFirstLastPara="0" vertOverflow="overflow" horzOverflow="overflow" vert="horz" wrap="square" lIns="91440" tIns="45720" rIns="91440" bIns="45720" numCol="1" spcCol="0" rtlCol="0" fromWordArt="0" anchor="t" anchorCtr="0" forceAA="0" compatLnSpc="1">
+            <a:prstTxWarp prst="textNoShape">
+              <a:avLst/>
+            </a:prstTxWarp>
+            <a:spAutoFit/>
+          </a:bodyPr>
+          <a:lstStyle/>
+          <a:p>
+            <a:r>
+              <a:rPr lang="en-US" sz="2400" dirty="0">
+                <a:solidFill>
+                  <a:schemeClr val="bg1"/>
+                </a:solidFill>
+                <a:latin typeface="Verdana"/>
+                <a:ea typeface="Verdana"/>
+                <a:cs typeface="Arial"/>
+              </a:rPr>
+              <a:t>We have created an Entity Relationship Diagram (ERD) model for our database. This database consists of tables for orders, inventory items, items in the orders</a:t>
+            </a:r>
+            <a:r>
+              <a:rPr lang="en-US" sz="3800" dirty="0">
+                <a:solidFill>
+                  <a:schemeClr val="bg1"/>
+                </a:solidFill>
+                <a:latin typeface="Arial"/>
+                <a:cs typeface="Arial"/>
+              </a:rPr>
+              <a:t>, </a:t>
+            </a:r>
+            <a:r>
+              <a:rPr lang="en-US" sz="2400" dirty="0">
+                <a:solidFill>
+                  <a:schemeClr val="bg1"/>
+                </a:solidFill>
+                <a:latin typeface="Verdana"/>
+                <a:ea typeface="Verdana"/>
+                <a:cs typeface="Arial"/>
+              </a:rPr>
+              <a:t>bundles, users, and logs for keeping track of changes to the database.</a:t>
+            </a:r>
+          </a:p>
+          <a:p>
+            <a:endParaRPr lang="en-US" sz="2400" dirty="0">
+              <a:solidFill>
+                <a:schemeClr val="bg1"/>
+              </a:solidFill>
+              <a:latin typeface="Verdana"/>
+              <a:ea typeface="Verdana"/>
+              <a:cs typeface="Arial"/>
+            </a:endParaRPr>
+          </a:p>
+          <a:p>
+            <a:r>
+              <a:rPr lang="en-US" sz="2400" dirty="0">
+                <a:solidFill>
+                  <a:schemeClr val="bg1"/>
+                </a:solidFill>
+                <a:latin typeface="Verdana"/>
+                <a:ea typeface="Verdana"/>
+                <a:cs typeface="Arial"/>
+              </a:rPr>
+              <a:t>We have also utilized a Singleton design pattern to ensure that there is only one connection to the database.</a:t>
+            </a:r>
+          </a:p>
+          <a:p>
+            <a:endParaRPr lang="en-US" sz="2400" dirty="0">
+              <a:solidFill>
+                <a:schemeClr val="bg1"/>
+              </a:solidFill>
+              <a:latin typeface="Verdana"/>
+              <a:ea typeface="Verdana"/>
+              <a:cs typeface="Arial"/>
+            </a:endParaRPr>
+          </a:p>
+          <a:p>
+            <a:endParaRPr lang="en-US" sz="2400" dirty="0">
+              <a:solidFill>
+                <a:schemeClr val="bg1"/>
+              </a:solidFill>
+              <a:latin typeface="Verdana"/>
+              <a:ea typeface="Verdana"/>
+              <a:cs typeface="Arial"/>
+            </a:endParaRPr>
+          </a:p>
+        </p:txBody>
+      </p:sp>
     </p:spTree>
   </p:cSld>
   <p:clrMapOvr>
@@ -6631,23 +6721,6 @@
 </file>
 
 <file path=customXml/item1.xml><?xml version="1.0" encoding="utf-8"?>
-<?mso-contentType ?>
-<FormTemplates xmlns="http://schemas.microsoft.com/sharepoint/v3/contenttype/forms">
-  <Display>DocumentLibraryForm</Display>
-  <Edit>DocumentLibraryForm</Edit>
-  <New>DocumentLibraryForm</New>
-</FormTemplates>
-</file>
-
-<file path=customXml/item2.xml><?xml version="1.0" encoding="utf-8"?>
-<p:properties xmlns:p="http://schemas.microsoft.com/office/2006/metadata/properties" xmlns:xsi="http://www.w3.org/2001/XMLSchema-instance" xmlns:pc="http://schemas.microsoft.com/office/infopath/2007/PartnerControls">
-  <documentManagement>
-    <_activity xmlns="638ed67b-20b9-4061-9a18-20e86443067d" xsi:nil="true"/>
-  </documentManagement>
-</p:properties>
-</file>
-
-<file path=customXml/item3.xml><?xml version="1.0" encoding="utf-8"?>
 <ct:contentTypeSchema xmlns:ct="http://schemas.microsoft.com/office/2006/metadata/contentType" xmlns:ma="http://schemas.microsoft.com/office/2006/metadata/properties/metaAttributes" ct:_="" ma:_="" ma:contentTypeName="Document" ma:contentTypeID="0x010100AD32CDFED766C34FA4B245A707B7CFEE" ma:contentTypeVersion="10" ma:contentTypeDescription="Create a new document." ma:contentTypeScope="" ma:versionID="ac7be4f140904b0904450ae38c603afb">
   <xsd:schema xmlns:xsd="http://www.w3.org/2001/XMLSchema" xmlns:xs="http://www.w3.org/2001/XMLSchema" xmlns:p="http://schemas.microsoft.com/office/2006/metadata/properties" xmlns:ns3="638ed67b-20b9-4061-9a18-20e86443067d" targetNamespace="http://schemas.microsoft.com/office/2006/metadata/properties" ma:root="true" ma:fieldsID="e64104e6d46d07c9324b5d6dc6870be7" ns3:_="">
     <xsd:import namespace="638ed67b-20b9-4061-9a18-20e86443067d"/>
@@ -6829,10 +6902,37 @@
 </ct:contentTypeSchema>
 </file>
 
+<file path=customXml/item2.xml><?xml version="1.0" encoding="utf-8"?>
+<p:properties xmlns:p="http://schemas.microsoft.com/office/2006/metadata/properties" xmlns:xsi="http://www.w3.org/2001/XMLSchema-instance" xmlns:pc="http://schemas.microsoft.com/office/infopath/2007/PartnerControls">
+  <documentManagement>
+    <_activity xmlns="638ed67b-20b9-4061-9a18-20e86443067d" xsi:nil="true"/>
+  </documentManagement>
+</p:properties>
+</file>
+
+<file path=customXml/item3.xml><?xml version="1.0" encoding="utf-8"?>
+<?mso-contentType ?>
+<FormTemplates xmlns="http://schemas.microsoft.com/sharepoint/v3/contenttype/forms">
+  <Display>DocumentLibraryForm</Display>
+  <Edit>DocumentLibraryForm</Edit>
+  <New>DocumentLibraryForm</New>
+</FormTemplates>
+</file>
+
 <file path=customXml/itemProps1.xml><?xml version="1.0" encoding="utf-8"?>
-<ds:datastoreItem xmlns:ds="http://schemas.openxmlformats.org/officeDocument/2006/customXml" ds:itemID="{EA638ADA-06DF-45AB-BFB2-D0D6F294C0ED}">
+<ds:datastoreItem xmlns:ds="http://schemas.openxmlformats.org/officeDocument/2006/customXml" ds:itemID="{837035A9-003D-4B1A-ACCB-239268A61DA1}">
   <ds:schemaRefs>
-    <ds:schemaRef ds:uri="http://schemas.microsoft.com/sharepoint/v3/contenttype/forms"/>
+    <ds:schemaRef ds:uri="638ed67b-20b9-4061-9a18-20e86443067d"/>
+    <ds:schemaRef ds:uri="http://purl.org/dc/elements/1.1/"/>
+    <ds:schemaRef ds:uri="http://purl.org/dc/terms/"/>
+    <ds:schemaRef ds:uri="http://schemas.microsoft.com/internal/obd"/>
+    <ds:schemaRef ds:uri="http://schemas.microsoft.com/office/2006/documentManagement/types"/>
+    <ds:schemaRef ds:uri="http://schemas.microsoft.com/office/2006/metadata/contentType"/>
+    <ds:schemaRef ds:uri="http://schemas.microsoft.com/office/2006/metadata/properties"/>
+    <ds:schemaRef ds:uri="http://schemas.microsoft.com/office/2006/metadata/properties/metaAttributes"/>
+    <ds:schemaRef ds:uri="http://schemas.microsoft.com/office/infopath/2007/PartnerControls"/>
+    <ds:schemaRef ds:uri="http://schemas.openxmlformats.org/package/2006/metadata/core-properties"/>
+    <ds:schemaRef ds:uri="http://www.w3.org/2001/XMLSchema"/>
   </ds:schemaRefs>
 </ds:datastoreItem>
 </file>
@@ -6854,19 +6954,9 @@
 </file>
 
 <file path=customXml/itemProps3.xml><?xml version="1.0" encoding="utf-8"?>
-<ds:datastoreItem xmlns:ds="http://schemas.openxmlformats.org/officeDocument/2006/customXml" ds:itemID="{837035A9-003D-4B1A-ACCB-239268A61DA1}">
+<ds:datastoreItem xmlns:ds="http://schemas.openxmlformats.org/officeDocument/2006/customXml" ds:itemID="{EA638ADA-06DF-45AB-BFB2-D0D6F294C0ED}">
   <ds:schemaRefs>
-    <ds:schemaRef ds:uri="638ed67b-20b9-4061-9a18-20e86443067d"/>
-    <ds:schemaRef ds:uri="http://purl.org/dc/elements/1.1/"/>
-    <ds:schemaRef ds:uri="http://purl.org/dc/terms/"/>
-    <ds:schemaRef ds:uri="http://schemas.microsoft.com/internal/obd"/>
-    <ds:schemaRef ds:uri="http://schemas.microsoft.com/office/2006/documentManagement/types"/>
-    <ds:schemaRef ds:uri="http://schemas.microsoft.com/office/2006/metadata/contentType"/>
-    <ds:schemaRef ds:uri="http://schemas.microsoft.com/office/2006/metadata/properties"/>
-    <ds:schemaRef ds:uri="http://schemas.microsoft.com/office/2006/metadata/properties/metaAttributes"/>
-    <ds:schemaRef ds:uri="http://schemas.microsoft.com/office/infopath/2007/PartnerControls"/>
-    <ds:schemaRef ds:uri="http://schemas.openxmlformats.org/package/2006/metadata/core-properties"/>
-    <ds:schemaRef ds:uri="http://www.w3.org/2001/XMLSchema"/>
+    <ds:schemaRef ds:uri="http://schemas.microsoft.com/sharepoint/v3/contenttype/forms"/>
   </ds:schemaRefs>
 </ds:datastoreItem>
 </file>
</xml_diff>